<commit_message>
made figure1 match our exp design
</commit_message>
<xml_diff>
--- a/submission/figures/Figure1_expdesign.pptx
+++ b/submission/figures/Figure1_expdesign.pptx
@@ -288,7 +288,7 @@
           <a:p>
             <a:fld id="{6C7FCF2E-E811-564D-9C70-F252E7528641}" type="datetimeFigureOut">
               <a:rPr lang="en-US" smtClean="0"/>
-              <a:t>6/12/17</a:t>
+              <a:t>6/23/17</a:t>
             </a:fld>
             <a:endParaRPr lang="en-US"/>
           </a:p>
@@ -458,7 +458,7 @@
           <a:p>
             <a:fld id="{6C7FCF2E-E811-564D-9C70-F252E7528641}" type="datetimeFigureOut">
               <a:rPr lang="en-US" smtClean="0"/>
-              <a:t>6/12/17</a:t>
+              <a:t>6/23/17</a:t>
             </a:fld>
             <a:endParaRPr lang="en-US"/>
           </a:p>
@@ -638,7 +638,7 @@
           <a:p>
             <a:fld id="{6C7FCF2E-E811-564D-9C70-F252E7528641}" type="datetimeFigureOut">
               <a:rPr lang="en-US" smtClean="0"/>
-              <a:t>6/12/17</a:t>
+              <a:t>6/23/17</a:t>
             </a:fld>
             <a:endParaRPr lang="en-US"/>
           </a:p>
@@ -808,7 +808,7 @@
           <a:p>
             <a:fld id="{6C7FCF2E-E811-564D-9C70-F252E7528641}" type="datetimeFigureOut">
               <a:rPr lang="en-US" smtClean="0"/>
-              <a:t>6/12/17</a:t>
+              <a:t>6/23/17</a:t>
             </a:fld>
             <a:endParaRPr lang="en-US"/>
           </a:p>
@@ -1054,7 +1054,7 @@
           <a:p>
             <a:fld id="{6C7FCF2E-E811-564D-9C70-F252E7528641}" type="datetimeFigureOut">
               <a:rPr lang="en-US" smtClean="0"/>
-              <a:t>6/12/17</a:t>
+              <a:t>6/23/17</a:t>
             </a:fld>
             <a:endParaRPr lang="en-US"/>
           </a:p>
@@ -1342,7 +1342,7 @@
           <a:p>
             <a:fld id="{6C7FCF2E-E811-564D-9C70-F252E7528641}" type="datetimeFigureOut">
               <a:rPr lang="en-US" smtClean="0"/>
-              <a:t>6/12/17</a:t>
+              <a:t>6/23/17</a:t>
             </a:fld>
             <a:endParaRPr lang="en-US"/>
           </a:p>
@@ -1764,7 +1764,7 @@
           <a:p>
             <a:fld id="{6C7FCF2E-E811-564D-9C70-F252E7528641}" type="datetimeFigureOut">
               <a:rPr lang="en-US" smtClean="0"/>
-              <a:t>6/12/17</a:t>
+              <a:t>6/23/17</a:t>
             </a:fld>
             <a:endParaRPr lang="en-US"/>
           </a:p>
@@ -1882,7 +1882,7 @@
           <a:p>
             <a:fld id="{6C7FCF2E-E811-564D-9C70-F252E7528641}" type="datetimeFigureOut">
               <a:rPr lang="en-US" smtClean="0"/>
-              <a:t>6/12/17</a:t>
+              <a:t>6/23/17</a:t>
             </a:fld>
             <a:endParaRPr lang="en-US"/>
           </a:p>
@@ -1977,7 +1977,7 @@
           <a:p>
             <a:fld id="{6C7FCF2E-E811-564D-9C70-F252E7528641}" type="datetimeFigureOut">
               <a:rPr lang="en-US" smtClean="0"/>
-              <a:t>6/12/17</a:t>
+              <a:t>6/23/17</a:t>
             </a:fld>
             <a:endParaRPr lang="en-US"/>
           </a:p>
@@ -2254,7 +2254,7 @@
           <a:p>
             <a:fld id="{6C7FCF2E-E811-564D-9C70-F252E7528641}" type="datetimeFigureOut">
               <a:rPr lang="en-US" smtClean="0"/>
-              <a:t>6/12/17</a:t>
+              <a:t>6/23/17</a:t>
             </a:fld>
             <a:endParaRPr lang="en-US"/>
           </a:p>
@@ -2507,7 +2507,7 @@
           <a:p>
             <a:fld id="{6C7FCF2E-E811-564D-9C70-F252E7528641}" type="datetimeFigureOut">
               <a:rPr lang="en-US" smtClean="0"/>
-              <a:t>6/12/17</a:t>
+              <a:t>6/23/17</a:t>
             </a:fld>
             <a:endParaRPr lang="en-US"/>
           </a:p>
@@ -2720,7 +2720,7 @@
           <a:p>
             <a:fld id="{6C7FCF2E-E811-564D-9C70-F252E7528641}" type="datetimeFigureOut">
               <a:rPr lang="en-US" smtClean="0"/>
-              <a:t>6/12/17</a:t>
+              <a:t>6/23/17</a:t>
             </a:fld>
             <a:endParaRPr lang="en-US"/>
           </a:p>
@@ -3097,100 +3097,6 @@
       </p:grpSpPr>
       <p:sp>
         <p:nvSpPr>
-          <p:cNvPr id="3" name="Footer Placeholder 3"/>
-          <p:cNvSpPr>
-            <a:spLocks noGrp="1"/>
-          </p:cNvSpPr>
-          <p:nvPr>
-            <p:ph type="ftr" sz="quarter" idx="11"/>
-          </p:nvPr>
-        </p:nvSpPr>
-        <p:spPr>
-          <a:xfrm>
-            <a:off x="223410" y="5850051"/>
-            <a:ext cx="8793197" cy="406541"/>
-          </a:xfrm>
-        </p:spPr>
-        <p:txBody>
-          <a:bodyPr/>
-          <a:lstStyle/>
-          <a:p>
-            <a:pPr algn="l"/>
-            <a:r>
-              <a:rPr lang="en-US" sz="1000" dirty="0">
-                <a:solidFill>
-                  <a:schemeClr val="tx1"/>
-                </a:solidFill>
-                <a:latin typeface="Arial"/>
-                <a:cs typeface="Arial"/>
-              </a:rPr>
-              <a:t>    , study agent administration; IV, </a:t>
-            </a:r>
-            <a:r>
-              <a:rPr lang="en-US" sz="1000" dirty="0" smtClean="0">
-                <a:solidFill>
-                  <a:schemeClr val="tx1"/>
-                </a:solidFill>
-                <a:latin typeface="Arial"/>
-                <a:cs typeface="Arial"/>
-              </a:rPr>
-              <a:t>intravenous; </a:t>
-            </a:r>
-            <a:r>
-              <a:rPr lang="en-US" sz="1000" dirty="0">
-                <a:solidFill>
-                  <a:schemeClr val="tx1"/>
-                </a:solidFill>
-                <a:latin typeface="Arial"/>
-                <a:cs typeface="Arial"/>
-              </a:rPr>
-              <a:t>PE, primary endpoint; R, randomization; RR, </a:t>
-            </a:r>
-            <a:r>
-              <a:rPr lang="en-US" sz="1000" dirty="0" err="1">
-                <a:solidFill>
-                  <a:schemeClr val="tx1"/>
-                </a:solidFill>
-                <a:latin typeface="Arial"/>
-                <a:cs typeface="Arial"/>
-              </a:rPr>
-              <a:t>rerandomization</a:t>
-            </a:r>
-            <a:r>
-              <a:rPr lang="en-US" sz="1000" dirty="0">
-                <a:solidFill>
-                  <a:schemeClr val="tx1"/>
-                </a:solidFill>
-                <a:latin typeface="Arial"/>
-                <a:cs typeface="Arial"/>
-              </a:rPr>
-              <a:t> (only for subjects receiving </a:t>
-            </a:r>
-            <a:r>
-              <a:rPr lang="en-US" sz="1000" dirty="0" err="1">
-                <a:solidFill>
-                  <a:schemeClr val="tx1"/>
-                </a:solidFill>
-                <a:latin typeface="Arial"/>
-                <a:cs typeface="Arial"/>
-              </a:rPr>
-              <a:t>ustekinumab</a:t>
-            </a:r>
-            <a:r>
-              <a:rPr lang="en-US" sz="1000" dirty="0">
-                <a:solidFill>
-                  <a:schemeClr val="tx1"/>
-                </a:solidFill>
-                <a:latin typeface="Arial"/>
-                <a:cs typeface="Arial"/>
-              </a:rPr>
-              <a:t> induction therapy); SC, subcutaneous; TNF, tumor necrosis factor α.</a:t>
-            </a:r>
-          </a:p>
-        </p:txBody>
-      </p:sp>
-      <p:sp>
-        <p:nvSpPr>
           <p:cNvPr id="4" name="Text Placeholder 9"/>
           <p:cNvSpPr txBox="1">
             <a:spLocks/>
@@ -3347,11 +3253,19 @@
           </a:lstStyle>
           <a:p>
             <a:r>
-              <a:rPr lang="en-US" smtClean="0"/>
-              <a:t>Adapted from Sandborn, et al. </a:t>
-            </a:r>
-            <a:r>
-              <a:rPr lang="en-US" i="1" smtClean="0">
+              <a:rPr lang="en-US" dirty="0" smtClean="0"/>
+              <a:t>Adapted from </a:t>
+            </a:r>
+            <a:r>
+              <a:rPr lang="en-US" dirty="0" err="1" smtClean="0"/>
+              <a:t>Sandborn</a:t>
+            </a:r>
+            <a:r>
+              <a:rPr lang="en-US" dirty="0" smtClean="0"/>
+              <a:t>, et al. </a:t>
+            </a:r>
+            <a:r>
+              <a:rPr lang="en-US" i="1" dirty="0" smtClean="0">
                 <a:solidFill>
                   <a:srgbClr val="000000"/>
                 </a:solidFill>
@@ -3359,11 +3273,15 @@
               <a:t>N </a:t>
             </a:r>
             <a:r>
-              <a:rPr lang="en-US" i="1" smtClean="0"/>
-              <a:t>Engl J Med </a:t>
-            </a:r>
-            <a:r>
-              <a:rPr lang="en-US" smtClean="0"/>
+              <a:rPr lang="en-US" i="1" dirty="0" err="1" smtClean="0"/>
+              <a:t>Engl</a:t>
+            </a:r>
+            <a:r>
+              <a:rPr lang="en-US" i="1" dirty="0" smtClean="0"/>
+              <a:t> J Med </a:t>
+            </a:r>
+            <a:r>
+              <a:rPr lang="en-US" dirty="0" smtClean="0"/>
               <a:t>2012;367:1519-28.</a:t>
             </a:r>
             <a:endParaRPr lang="en-US" dirty="0"/>
@@ -4298,7 +4216,23 @@
                   <a:cs typeface="Arial"/>
                   <a:sym typeface="Wingdings"/>
                 </a:rPr>
-                <a:t> 90 mg SC*</a:t>
+                <a:t> 90 </a:t>
+              </a:r>
+              <a:r>
+                <a:rPr lang="en-US" sz="1200">
+                  <a:latin typeface="Arial"/>
+                  <a:cs typeface="Arial"/>
+                  <a:sym typeface="Wingdings"/>
+                </a:rPr>
+                <a:t>mg </a:t>
+              </a:r>
+              <a:r>
+                <a:rPr lang="en-US" sz="1200" smtClean="0">
+                  <a:latin typeface="Arial"/>
+                  <a:cs typeface="Arial"/>
+                  <a:sym typeface="Wingdings"/>
+                </a:rPr>
+                <a:t>SC</a:t>
               </a:r>
               <a:endParaRPr lang="en-US" sz="1200" dirty="0">
                 <a:latin typeface="Arial"/>
@@ -4906,55 +4840,6 @@
       </p:grpSp>
       <p:sp>
         <p:nvSpPr>
-          <p:cNvPr id="49" name="Up Arrow 48"/>
-          <p:cNvSpPr/>
-          <p:nvPr/>
-        </p:nvSpPr>
-        <p:spPr>
-          <a:xfrm>
-            <a:off x="338518" y="5941155"/>
-            <a:ext cx="97828" cy="119368"/>
-          </a:xfrm>
-          <a:prstGeom prst="upArrow">
-            <a:avLst/>
-          </a:prstGeom>
-          <a:solidFill>
-            <a:schemeClr val="tx1"/>
-          </a:solidFill>
-          <a:ln>
-            <a:solidFill>
-              <a:srgbClr val="000000"/>
-            </a:solidFill>
-          </a:ln>
-        </p:spPr>
-        <p:style>
-          <a:lnRef idx="1">
-            <a:schemeClr val="accent1"/>
-          </a:lnRef>
-          <a:fillRef idx="3">
-            <a:schemeClr val="accent1"/>
-          </a:fillRef>
-          <a:effectRef idx="2">
-            <a:schemeClr val="accent1"/>
-          </a:effectRef>
-          <a:fontRef idx="minor">
-            <a:schemeClr val="lt1"/>
-          </a:fontRef>
-        </p:style>
-        <p:txBody>
-          <a:bodyPr rtlCol="0" anchor="ctr"/>
-          <a:lstStyle/>
-          <a:p>
-            <a:pPr algn="ctr"/>
-            <a:endParaRPr lang="en-US">
-              <a:latin typeface="Arial"/>
-              <a:cs typeface="Arial"/>
-            </a:endParaRPr>
-          </a:p>
-        </p:txBody>
-      </p:sp>
-      <p:sp>
-        <p:nvSpPr>
           <p:cNvPr id="50" name="Rectangle 49"/>
           <p:cNvSpPr/>
           <p:nvPr/>
@@ -5008,101 +4893,12 @@
         </p:nvGrpSpPr>
         <p:grpSpPr>
           <a:xfrm>
-            <a:off x="154111" y="3944040"/>
-            <a:ext cx="9011666" cy="1847836"/>
-            <a:chOff x="154111" y="4220915"/>
-            <a:chExt cx="8531501" cy="1667841"/>
+            <a:off x="154111" y="4266534"/>
+            <a:ext cx="9004082" cy="1470653"/>
+            <a:chOff x="154111" y="4551516"/>
+            <a:chExt cx="8524329" cy="1327396"/>
           </a:xfrm>
         </p:grpSpPr>
-        <p:sp>
-          <p:nvSpPr>
-            <p:cNvPr id="52" name="Rectangle 51"/>
-            <p:cNvSpPr/>
-            <p:nvPr/>
-          </p:nvSpPr>
-          <p:spPr>
-            <a:xfrm>
-              <a:off x="394918" y="4220915"/>
-              <a:ext cx="235530" cy="250017"/>
-            </a:xfrm>
-            <a:prstGeom prst="rect">
-              <a:avLst/>
-            </a:prstGeom>
-          </p:spPr>
-          <p:txBody>
-            <a:bodyPr wrap="none">
-              <a:spAutoFit/>
-            </a:bodyPr>
-            <a:lstStyle/>
-            <a:p>
-              <a:r>
-                <a:rPr lang="en-US" sz="1200" dirty="0">
-                  <a:latin typeface="Arial"/>
-                  <a:cs typeface="Arial"/>
-                </a:rPr>
-                <a:t>*</a:t>
-              </a:r>
-              <a:r>
-                <a:rPr lang="en-US" sz="1000" dirty="0">
-                  <a:effectLst/>
-                  <a:latin typeface="Arial"/>
-                  <a:cs typeface="Arial"/>
-                </a:rPr>
-                <a:t> </a:t>
-              </a:r>
-              <a:endParaRPr lang="en-US" sz="1000" dirty="0">
-                <a:latin typeface="Arial"/>
-                <a:cs typeface="Arial"/>
-              </a:endParaRPr>
-            </a:p>
-          </p:txBody>
-        </p:sp>
-        <p:sp>
-          <p:nvSpPr>
-            <p:cNvPr id="53" name="TextBox 52"/>
-            <p:cNvSpPr txBox="1"/>
-            <p:nvPr/>
-          </p:nvSpPr>
-          <p:spPr>
-            <a:xfrm>
-              <a:off x="503436" y="4234155"/>
-              <a:ext cx="8147442" cy="208347"/>
-            </a:xfrm>
-            <a:prstGeom prst="rect">
-              <a:avLst/>
-            </a:prstGeom>
-            <a:noFill/>
-          </p:spPr>
-          <p:txBody>
-            <a:bodyPr wrap="none" rtlCol="0">
-              <a:spAutoFit/>
-            </a:bodyPr>
-            <a:lstStyle/>
-            <a:p>
-              <a:r>
-                <a:rPr lang="en-US" sz="900" dirty="0">
-                  <a:latin typeface="Arial"/>
-                  <a:cs typeface="Arial"/>
-                </a:rPr>
-                <a:t>Subjects receiving placebo at Week 0 who were not in clinical response at Week 6 received </a:t>
-              </a:r>
-              <a:r>
-                <a:rPr lang="en-US" sz="900" dirty="0" err="1">
-                  <a:latin typeface="Arial"/>
-                  <a:cs typeface="Arial"/>
-                </a:rPr>
-                <a:t>ustekinumab</a:t>
-              </a:r>
-              <a:r>
-                <a:rPr lang="en-US" sz="900" dirty="0">
-                  <a:latin typeface="Arial"/>
-                  <a:cs typeface="Arial"/>
-                </a:rPr>
-                <a:t> 270 mg SC and 90 mg SC at Weeks 8 and 16, respectively.</a:t>
-              </a:r>
-            </a:p>
-          </p:txBody>
-        </p:sp>
         <p:cxnSp>
           <p:nvCxnSpPr>
             <p:cNvPr id="54" name="Straight Connector 53"/>
@@ -5110,9 +4906,9 @@
             <p:nvPr/>
           </p:nvCxnSpPr>
           <p:spPr>
-            <a:xfrm flipV="1">
-              <a:off x="690700" y="4976640"/>
-              <a:ext cx="7421941" cy="17280"/>
+            <a:xfrm>
+              <a:off x="690700" y="4993921"/>
+              <a:ext cx="7379773" cy="0"/>
             </a:xfrm>
             <a:prstGeom prst="line">
               <a:avLst/>
@@ -5181,7 +4977,7 @@
           </p:nvCxnSpPr>
           <p:spPr>
             <a:xfrm>
-              <a:off x="1447876" y="4930320"/>
+              <a:off x="1845475" y="4911841"/>
               <a:ext cx="0" cy="164160"/>
             </a:xfrm>
             <a:prstGeom prst="line">
@@ -5216,7 +5012,7 @@
           </p:nvCxnSpPr>
           <p:spPr>
             <a:xfrm>
-              <a:off x="1824907" y="4933440"/>
+              <a:off x="2493372" y="4933440"/>
               <a:ext cx="0" cy="164160"/>
             </a:xfrm>
             <a:prstGeom prst="line">
@@ -5251,7 +5047,7 @@
           </p:nvCxnSpPr>
           <p:spPr>
             <a:xfrm>
-              <a:off x="2187773" y="4933440"/>
+              <a:off x="3102363" y="4911841"/>
               <a:ext cx="0" cy="164160"/>
             </a:xfrm>
             <a:prstGeom prst="line">
@@ -5286,7 +5082,7 @@
           </p:nvCxnSpPr>
           <p:spPr>
             <a:xfrm>
-              <a:off x="3584025" y="4930320"/>
+              <a:off x="5590586" y="4942080"/>
               <a:ext cx="0" cy="164160"/>
             </a:xfrm>
             <a:prstGeom prst="line">
@@ -5321,42 +5117,7 @@
           </p:nvCxnSpPr>
           <p:spPr>
             <a:xfrm>
-              <a:off x="4771784" y="4933440"/>
-              <a:ext cx="0" cy="164160"/>
-            </a:xfrm>
-            <a:prstGeom prst="line">
-              <a:avLst/>
-            </a:prstGeom>
-            <a:ln>
-              <a:solidFill>
-                <a:srgbClr val="000000"/>
-              </a:solidFill>
-            </a:ln>
-          </p:spPr>
-          <p:style>
-            <a:lnRef idx="2">
-              <a:schemeClr val="accent1"/>
-            </a:lnRef>
-            <a:fillRef idx="0">
-              <a:schemeClr val="accent1"/>
-            </a:fillRef>
-            <a:effectRef idx="1">
-              <a:schemeClr val="accent1"/>
-            </a:effectRef>
-            <a:fontRef idx="minor">
-              <a:schemeClr val="tx1"/>
-            </a:fontRef>
-          </p:style>
-        </p:cxnSp>
-        <p:cxnSp>
-          <p:nvCxnSpPr>
-            <p:cNvPr id="61" name="Straight Connector 60"/>
-            <p:cNvCxnSpPr/>
-            <p:nvPr/>
-          </p:nvCxnSpPr>
-          <p:spPr>
-            <a:xfrm>
-              <a:off x="8112641" y="4933440"/>
+              <a:off x="8045738" y="4928010"/>
               <a:ext cx="0" cy="164160"/>
             </a:xfrm>
             <a:prstGeom prst="line">
@@ -5455,7 +5216,7 @@
           </p:nvSpPr>
           <p:spPr>
             <a:xfrm>
-              <a:off x="1312750" y="5120140"/>
+              <a:off x="1725321" y="5101358"/>
               <a:ext cx="255851" cy="250017"/>
             </a:xfrm>
             <a:prstGeom prst="rect">
@@ -5487,7 +5248,7 @@
           </p:nvSpPr>
           <p:spPr>
             <a:xfrm>
-              <a:off x="1689781" y="5120140"/>
+              <a:off x="2372888" y="5120140"/>
               <a:ext cx="255851" cy="250017"/>
             </a:xfrm>
             <a:prstGeom prst="rect">
@@ -5519,7 +5280,7 @@
           </p:nvSpPr>
           <p:spPr>
             <a:xfrm>
-              <a:off x="2052647" y="5120400"/>
+              <a:off x="2975103" y="5120400"/>
               <a:ext cx="255851" cy="250017"/>
             </a:xfrm>
             <a:prstGeom prst="rect">
@@ -5551,7 +5312,7 @@
           </p:nvSpPr>
           <p:spPr>
             <a:xfrm>
-              <a:off x="3448899" y="5120400"/>
+              <a:off x="5415940" y="5109980"/>
               <a:ext cx="336877" cy="250017"/>
             </a:xfrm>
             <a:prstGeom prst="rect">
@@ -5583,7 +5344,7 @@
           </p:nvSpPr>
           <p:spPr>
             <a:xfrm>
-              <a:off x="4593865" y="5123059"/>
+              <a:off x="7851011" y="5123059"/>
               <a:ext cx="336877" cy="250017"/>
             </a:xfrm>
             <a:prstGeom prst="rect">
@@ -5609,38 +5370,6 @@
         </p:sp>
         <p:sp>
           <p:nvSpPr>
-            <p:cNvPr id="69" name="TextBox 68"/>
-            <p:cNvSpPr txBox="1"/>
-            <p:nvPr/>
-          </p:nvSpPr>
-          <p:spPr>
-            <a:xfrm>
-              <a:off x="7934722" y="5123059"/>
-              <a:ext cx="336877" cy="250017"/>
-            </a:xfrm>
-            <a:prstGeom prst="rect">
-              <a:avLst/>
-            </a:prstGeom>
-            <a:noFill/>
-          </p:spPr>
-          <p:txBody>
-            <a:bodyPr wrap="none" rtlCol="0">
-              <a:spAutoFit/>
-            </a:bodyPr>
-            <a:lstStyle/>
-            <a:p>
-              <a:r>
-                <a:rPr lang="en-US" sz="1200" dirty="0">
-                  <a:latin typeface="Arial"/>
-                  <a:cs typeface="Arial"/>
-                </a:rPr>
-                <a:t>36</a:t>
-              </a:r>
-            </a:p>
-          </p:txBody>
-        </p:sp>
-        <p:sp>
-          <p:nvSpPr>
             <p:cNvPr id="70" name="Up Arrow 69"/>
             <p:cNvSpPr/>
             <p:nvPr/>
@@ -5696,7 +5425,7 @@
           </p:nvSpPr>
           <p:spPr>
             <a:xfrm>
-              <a:off x="2134826" y="5383239"/>
+              <a:off x="3055311" y="5373076"/>
               <a:ext cx="90674" cy="215481"/>
             </a:xfrm>
             <a:prstGeom prst="upArrow">
@@ -5745,7 +5474,7 @@
           </p:nvSpPr>
           <p:spPr>
             <a:xfrm>
-              <a:off x="3574586" y="5383239"/>
+              <a:off x="5539042" y="5359996"/>
               <a:ext cx="90674" cy="215481"/>
             </a:xfrm>
             <a:prstGeom prst="upArrow">
@@ -5826,7 +5555,7 @@
           </p:nvSpPr>
           <p:spPr>
             <a:xfrm>
-              <a:off x="2005461" y="5628894"/>
+              <a:off x="2912043" y="5628894"/>
               <a:ext cx="377211" cy="250017"/>
             </a:xfrm>
             <a:prstGeom prst="rect">
@@ -5858,7 +5587,7 @@
           </p:nvSpPr>
           <p:spPr>
             <a:xfrm>
-              <a:off x="3406295" y="5626767"/>
+              <a:off x="5415940" y="5628895"/>
               <a:ext cx="377211" cy="250017"/>
             </a:xfrm>
             <a:prstGeom prst="rect">
@@ -5890,7 +5619,7 @@
           </p:nvSpPr>
           <p:spPr>
             <a:xfrm>
-              <a:off x="4096028" y="5367887"/>
+              <a:off x="7305146" y="5353063"/>
               <a:ext cx="1373294" cy="520869"/>
             </a:xfrm>
             <a:prstGeom prst="rect">
@@ -5927,47 +5656,14 @@
         </p:sp>
         <p:sp>
           <p:nvSpPr>
-            <p:cNvPr id="77" name="TextBox 76"/>
+            <p:cNvPr id="78" name="TextBox 77"/>
             <p:cNvSpPr txBox="1"/>
             <p:nvPr/>
           </p:nvSpPr>
           <p:spPr>
             <a:xfrm>
-              <a:off x="7312318" y="5367887"/>
-              <a:ext cx="1373294" cy="375025"/>
-            </a:xfrm>
-            <a:prstGeom prst="rect">
-              <a:avLst/>
-            </a:prstGeom>
-            <a:noFill/>
-          </p:spPr>
-          <p:txBody>
-            <a:bodyPr wrap="square" rtlCol="0">
-              <a:spAutoFit/>
-            </a:bodyPr>
-            <a:lstStyle/>
-            <a:p>
-              <a:pPr algn="ctr"/>
-              <a:r>
-                <a:rPr lang="en-US" sz="1050" dirty="0">
-                  <a:latin typeface="Arial"/>
-                  <a:cs typeface="Arial"/>
-                </a:rPr>
-                <a:t>Final efficacy and safety follow-up</a:t>
-              </a:r>
-            </a:p>
-          </p:txBody>
-        </p:sp>
-        <p:sp>
-          <p:nvSpPr>
-            <p:cNvPr id="78" name="TextBox 77"/>
-            <p:cNvSpPr txBox="1"/>
-            <p:nvPr/>
-          </p:nvSpPr>
-          <p:spPr>
-            <a:xfrm>
-              <a:off x="542983" y="4832182"/>
-              <a:ext cx="297302" cy="277797"/>
+              <a:off x="542983" y="4842064"/>
+              <a:ext cx="297302" cy="305576"/>
             </a:xfrm>
             <a:prstGeom prst="rect">
               <a:avLst/>
@@ -5981,7 +5677,7 @@
             <a:lstStyle/>
             <a:p>
               <a:r>
-                <a:rPr lang="en-US" sz="1400" b="1" dirty="0">
+                <a:rPr lang="en-US" sz="1600" b="1" dirty="0">
                   <a:solidFill>
                     <a:srgbClr val="FF0000"/>
                   </a:solidFill>
@@ -6008,8 +5704,8 @@
           </p:nvSpPr>
           <p:spPr>
             <a:xfrm>
-              <a:off x="1307180" y="4832182"/>
-              <a:ext cx="288195" cy="277797"/>
+              <a:off x="1703342" y="4814564"/>
+              <a:ext cx="308374" cy="305576"/>
             </a:xfrm>
             <a:prstGeom prst="rect">
               <a:avLst/>
@@ -6023,7 +5719,7 @@
             <a:lstStyle/>
             <a:p>
               <a:r>
-                <a:rPr lang="en-US" sz="1400" b="1" dirty="0">
+                <a:rPr lang="en-US" sz="1600" b="1" dirty="0">
                   <a:solidFill>
                     <a:srgbClr val="FF0000"/>
                   </a:solidFill>
@@ -6050,8 +5746,8 @@
           </p:nvSpPr>
           <p:spPr>
             <a:xfrm>
-              <a:off x="1684211" y="4832182"/>
-              <a:ext cx="288195" cy="277797"/>
+              <a:off x="2338929" y="4837748"/>
+              <a:ext cx="308374" cy="305576"/>
             </a:xfrm>
             <a:prstGeom prst="rect">
               <a:avLst/>
@@ -6065,7 +5761,7 @@
             <a:lstStyle/>
             <a:p>
               <a:r>
-                <a:rPr lang="en-US" sz="1400" b="1" dirty="0">
+                <a:rPr lang="en-US" sz="1600" b="1" dirty="0">
                   <a:solidFill>
                     <a:srgbClr val="FF0000"/>
                   </a:solidFill>
@@ -6092,8 +5788,8 @@
           </p:nvSpPr>
           <p:spPr>
             <a:xfrm>
-              <a:off x="4628425" y="4832182"/>
-              <a:ext cx="288195" cy="277797"/>
+              <a:off x="7899693" y="4838143"/>
+              <a:ext cx="308374" cy="305576"/>
             </a:xfrm>
             <a:prstGeom prst="rect">
               <a:avLst/>
@@ -6107,7 +5803,7 @@
             <a:lstStyle/>
             <a:p>
               <a:r>
-                <a:rPr lang="en-US" sz="1400" b="1" dirty="0">
+                <a:rPr lang="en-US" sz="1600" b="1" dirty="0">
                   <a:solidFill>
                     <a:srgbClr val="FF0000"/>
                   </a:solidFill>
@@ -6270,10 +5966,10 @@
           </p:nvGrpSpPr>
           <p:grpSpPr>
             <a:xfrm>
-              <a:off x="2014962" y="4610701"/>
-              <a:ext cx="350179" cy="260400"/>
-              <a:chOff x="894368" y="2868479"/>
-              <a:chExt cx="454854" cy="362880"/>
+              <a:off x="2925546" y="4597503"/>
+              <a:ext cx="350185" cy="260400"/>
+              <a:chOff x="2077144" y="2850088"/>
+              <a:chExt cx="454860" cy="362880"/>
             </a:xfrm>
           </p:grpSpPr>
           <p:sp>
@@ -6284,8 +5980,8 @@
             </p:nvSpPr>
             <p:spPr>
               <a:xfrm>
-                <a:off x="933084" y="2868479"/>
-                <a:ext cx="371506" cy="362880"/>
+                <a:off x="2115716" y="2850088"/>
+                <a:ext cx="371505" cy="362880"/>
               </a:xfrm>
               <a:prstGeom prst="ellipse">
                 <a:avLst/>
@@ -6331,8 +6027,8 @@
             </p:nvSpPr>
             <p:spPr>
               <a:xfrm>
-                <a:off x="894368" y="2886244"/>
-                <a:ext cx="454854" cy="309698"/>
+                <a:off x="2077144" y="2867426"/>
+                <a:ext cx="454860" cy="309698"/>
               </a:xfrm>
               <a:prstGeom prst="rect">
                 <a:avLst/>
@@ -6364,7 +6060,7 @@
           </p:nvSpPr>
           <p:spPr>
             <a:xfrm>
-              <a:off x="1649725" y="4621780"/>
+              <a:off x="2364887" y="4621780"/>
               <a:ext cx="352977" cy="236127"/>
             </a:xfrm>
             <a:prstGeom prst="rect">
@@ -6396,7 +6092,7 @@
           </p:nvSpPr>
           <p:spPr>
             <a:xfrm>
-              <a:off x="175039" y="4472460"/>
+              <a:off x="175039" y="4551516"/>
               <a:ext cx="297573" cy="277797"/>
             </a:xfrm>
             <a:prstGeom prst="rect">

</xml_diff>